<commit_message>
mike made minor edits to the LSV log flowchart
</commit_message>
<xml_diff>
--- a/docs/experiment-logic-flowcharts/experiment-logic-flowchart-LSV.pptx
+++ b/docs/experiment-logic-flowcharts/experiment-logic-flowchart-LSV.pptx
@@ -106,6 +106,11 @@
       </a:defRPr>
     </a:lvl9pPr>
   </p:defaultTextStyle>
+  <p:extLst>
+    <p:ext uri="{EFAFB233-063F-42B5-8137-9DF3F51BA10A}">
+      <p15:sldGuideLst xmlns:p15="http://schemas.microsoft.com/office/powerpoint/2012/main"/>
+    </p:ext>
+  </p:extLst>
 </p:presentation>
 </file>
 
@@ -3346,7 +3351,11 @@
           <a:p>
             <a:r>
               <a:rPr lang="en-US" dirty="0"/>
-              <a:t>Experiment Logic Flow Chart</a:t>
+              <a:t>Experiment </a:t>
+            </a:r>
+            <a:r>
+              <a:rPr lang="en-US"/>
+              <a:t>Logic Flowchart</a:t>
             </a:r>
             <a:br>
               <a:rPr lang="en-US" dirty="0"/>
@@ -3402,8 +3411,8 @@
         </p:nvSpPr>
         <p:spPr>
           <a:xfrm>
-            <a:off x="353592" y="113562"/>
-            <a:ext cx="2265844" cy="1371600"/>
+            <a:off x="353592" y="351464"/>
+            <a:ext cx="2265844" cy="1045210"/>
           </a:xfrm>
           <a:prstGeom prst="ellipse">
             <a:avLst/>
@@ -3461,7 +3470,7 @@
         </p:nvSpPr>
         <p:spPr>
           <a:xfrm>
-            <a:off x="219505" y="1807906"/>
+            <a:off x="219505" y="1719418"/>
             <a:ext cx="2534019" cy="1095314"/>
           </a:xfrm>
           <a:prstGeom prst="rect">
@@ -3524,7 +3533,7 @@
         </p:nvCxnSpPr>
         <p:spPr>
           <a:xfrm>
-            <a:off x="1486514" y="1485162"/>
+            <a:off x="1486514" y="1396674"/>
             <a:ext cx="1" cy="322744"/>
           </a:xfrm>
           <a:prstGeom prst="straightConnector1">
@@ -3566,7 +3575,7 @@
         </p:nvSpPr>
         <p:spPr>
           <a:xfrm>
-            <a:off x="219504" y="3233584"/>
+            <a:off x="219504" y="3145096"/>
             <a:ext cx="2534019" cy="1427316"/>
           </a:xfrm>
           <a:prstGeom prst="rect">
@@ -3725,7 +3734,7 @@
         </p:nvCxnSpPr>
         <p:spPr>
           <a:xfrm flipH="1">
-            <a:off x="1486514" y="2903220"/>
+            <a:off x="1486514" y="2814732"/>
             <a:ext cx="1" cy="330364"/>
           </a:xfrm>
           <a:prstGeom prst="straightConnector1">
@@ -3767,7 +3776,7 @@
         </p:nvSpPr>
         <p:spPr>
           <a:xfrm>
-            <a:off x="219504" y="4987454"/>
+            <a:off x="219504" y="4898966"/>
             <a:ext cx="2534019" cy="1095314"/>
           </a:xfrm>
           <a:prstGeom prst="rect">
@@ -3807,7 +3816,7 @@
                   <a:schemeClr val="tx1"/>
                 </a:solidFill>
               </a:rPr>
-              <a:t>Save file to a new name in working directory</a:t>
+              <a:t>Save config file to a new name in working directory</a:t>
             </a:r>
           </a:p>
         </p:txBody>
@@ -3830,7 +3839,7 @@
         </p:nvCxnSpPr>
         <p:spPr>
           <a:xfrm>
-            <a:off x="1486514" y="4660900"/>
+            <a:off x="1486514" y="4572412"/>
             <a:ext cx="0" cy="326554"/>
           </a:xfrm>
           <a:prstGeom prst="straightConnector1">
@@ -3872,7 +3881,7 @@
         </p:nvSpPr>
         <p:spPr>
           <a:xfrm>
-            <a:off x="1303633" y="6418048"/>
+            <a:off x="1303633" y="6329560"/>
             <a:ext cx="365760" cy="365760"/>
           </a:xfrm>
           <a:prstGeom prst="ellipse">
@@ -3935,7 +3944,7 @@
         </p:nvCxnSpPr>
         <p:spPr>
           <a:xfrm flipH="1">
-            <a:off x="1486513" y="6082768"/>
+            <a:off x="1486513" y="5994280"/>
             <a:ext cx="1" cy="335280"/>
           </a:xfrm>
           <a:prstGeom prst="straightConnector1">
@@ -6452,6 +6461,606 @@
           <a:chExt cx="0" cy="0"/>
         </a:xfrm>
       </p:grpSpPr>
+      <p:sp>
+        <p:nvSpPr>
+          <p:cNvPr id="2" name="Arrow: Pentagon 1">
+            <a:extLst>
+              <a:ext uri="{FF2B5EF4-FFF2-40B4-BE49-F238E27FC236}">
+                <a16:creationId xmlns:a16="http://schemas.microsoft.com/office/drawing/2014/main" id="{6FE24C80-4BD7-4419-B2EF-B221A0D37AE8}"/>
+              </a:ext>
+            </a:extLst>
+          </p:cNvPr>
+          <p:cNvSpPr/>
+          <p:nvPr/>
+        </p:nvSpPr>
+        <p:spPr>
+          <a:xfrm rot="16200000">
+            <a:off x="1407940" y="212503"/>
+            <a:ext cx="365760" cy="365760"/>
+          </a:xfrm>
+          <a:prstGeom prst="homePlate">
+            <a:avLst>
+              <a:gd name="adj" fmla="val 37353"/>
+            </a:avLst>
+          </a:prstGeom>
+          <a:noFill/>
+          <a:ln>
+            <a:solidFill>
+              <a:schemeClr val="tx1"/>
+            </a:solidFill>
+          </a:ln>
+        </p:spPr>
+        <p:style>
+          <a:lnRef idx="2">
+            <a:schemeClr val="accent1">
+              <a:shade val="50000"/>
+            </a:schemeClr>
+          </a:lnRef>
+          <a:fillRef idx="1">
+            <a:schemeClr val="accent1"/>
+          </a:fillRef>
+          <a:effectRef idx="0">
+            <a:schemeClr val="accent1"/>
+          </a:effectRef>
+          <a:fontRef idx="minor">
+            <a:schemeClr val="lt1"/>
+          </a:fontRef>
+        </p:style>
+        <p:txBody>
+          <a:bodyPr vert="vert" rtlCol="0" anchor="ctr"/>
+          <a:lstStyle/>
+          <a:p>
+            <a:pPr algn="ctr"/>
+            <a:r>
+              <a:rPr lang="en-US" dirty="0">
+                <a:solidFill>
+                  <a:schemeClr val="tx1"/>
+                </a:solidFill>
+              </a:rPr>
+              <a:t>C</a:t>
+            </a:r>
+          </a:p>
+        </p:txBody>
+      </p:sp>
+      <p:sp>
+        <p:nvSpPr>
+          <p:cNvPr id="3" name="Parallelogram 2">
+            <a:extLst>
+              <a:ext uri="{FF2B5EF4-FFF2-40B4-BE49-F238E27FC236}">
+                <a16:creationId xmlns:a16="http://schemas.microsoft.com/office/drawing/2014/main" id="{381FD8E9-1249-47B8-B698-61C6F1FCC186}"/>
+              </a:ext>
+            </a:extLst>
+          </p:cNvPr>
+          <p:cNvSpPr/>
+          <p:nvPr/>
+        </p:nvSpPr>
+        <p:spPr>
+          <a:xfrm>
+            <a:off x="182340" y="846362"/>
+            <a:ext cx="2816959" cy="817983"/>
+          </a:xfrm>
+          <a:prstGeom prst="parallelogram">
+            <a:avLst/>
+          </a:prstGeom>
+          <a:noFill/>
+          <a:ln>
+            <a:solidFill>
+              <a:schemeClr val="tx1"/>
+            </a:solidFill>
+          </a:ln>
+        </p:spPr>
+        <p:style>
+          <a:lnRef idx="2">
+            <a:schemeClr val="accent1">
+              <a:shade val="50000"/>
+            </a:schemeClr>
+          </a:lnRef>
+          <a:fillRef idx="1">
+            <a:schemeClr val="accent1"/>
+          </a:fillRef>
+          <a:effectRef idx="0">
+            <a:schemeClr val="accent1"/>
+          </a:effectRef>
+          <a:fontRef idx="minor">
+            <a:schemeClr val="lt1"/>
+          </a:fontRef>
+        </p:style>
+        <p:txBody>
+          <a:bodyPr rtlCol="0" anchor="ctr"/>
+          <a:lstStyle/>
+          <a:p>
+            <a:pPr algn="ctr"/>
+            <a:r>
+              <a:rPr lang="en-US" dirty="0">
+                <a:solidFill>
+                  <a:schemeClr val="tx1"/>
+                </a:solidFill>
+              </a:rPr>
+              <a:t>Input sweep rate (SR) in place of &lt;?&gt;</a:t>
+            </a:r>
+          </a:p>
+        </p:txBody>
+      </p:sp>
+      <p:sp>
+        <p:nvSpPr>
+          <p:cNvPr id="4" name="Diamond 3">
+            <a:extLst>
+              <a:ext uri="{FF2B5EF4-FFF2-40B4-BE49-F238E27FC236}">
+                <a16:creationId xmlns:a16="http://schemas.microsoft.com/office/drawing/2014/main" id="{3B940B7A-3342-4377-B90E-FDEAC1DFD3A0}"/>
+              </a:ext>
+            </a:extLst>
+          </p:cNvPr>
+          <p:cNvSpPr/>
+          <p:nvPr/>
+        </p:nvSpPr>
+        <p:spPr>
+          <a:xfrm>
+            <a:off x="95250" y="1930230"/>
+            <a:ext cx="2991140" cy="1232650"/>
+          </a:xfrm>
+          <a:prstGeom prst="diamond">
+            <a:avLst/>
+          </a:prstGeom>
+          <a:noFill/>
+          <a:ln>
+            <a:solidFill>
+              <a:schemeClr val="tx1"/>
+            </a:solidFill>
+          </a:ln>
+        </p:spPr>
+        <p:style>
+          <a:lnRef idx="2">
+            <a:schemeClr val="accent1">
+              <a:shade val="50000"/>
+            </a:schemeClr>
+          </a:lnRef>
+          <a:fillRef idx="1">
+            <a:schemeClr val="accent1"/>
+          </a:fillRef>
+          <a:effectRef idx="0">
+            <a:schemeClr val="accent1"/>
+          </a:effectRef>
+          <a:fontRef idx="minor">
+            <a:schemeClr val="lt1"/>
+          </a:fontRef>
+        </p:style>
+        <p:txBody>
+          <a:bodyPr lIns="0" tIns="0" rIns="0" bIns="0" rtlCol="0" anchor="ctr"/>
+          <a:lstStyle/>
+          <a:p>
+            <a:pPr algn="ctr"/>
+            <a:endParaRPr lang="en-US" dirty="0">
+              <a:solidFill>
+                <a:schemeClr val="tx1"/>
+              </a:solidFill>
+            </a:endParaRPr>
+          </a:p>
+        </p:txBody>
+      </p:sp>
+      <p:cxnSp>
+        <p:nvCxnSpPr>
+          <p:cNvPr id="5" name="Straight Arrow Connector 4">
+            <a:extLst>
+              <a:ext uri="{FF2B5EF4-FFF2-40B4-BE49-F238E27FC236}">
+                <a16:creationId xmlns:a16="http://schemas.microsoft.com/office/drawing/2014/main" id="{41D9D7EA-8004-4E66-8D8F-D1525070FB71}"/>
+              </a:ext>
+            </a:extLst>
+          </p:cNvPr>
+          <p:cNvCxnSpPr>
+            <a:cxnSpLocks/>
+            <a:stCxn id="3" idx="4"/>
+            <a:endCxn id="4" idx="0"/>
+          </p:cNvCxnSpPr>
+          <p:nvPr/>
+        </p:nvCxnSpPr>
+        <p:spPr>
+          <a:xfrm>
+            <a:off x="1590820" y="1664345"/>
+            <a:ext cx="0" cy="265885"/>
+          </a:xfrm>
+          <a:prstGeom prst="straightConnector1">
+            <a:avLst/>
+          </a:prstGeom>
+          <a:ln w="12700">
+            <a:solidFill>
+              <a:schemeClr val="tx1"/>
+            </a:solidFill>
+            <a:tailEnd type="triangle"/>
+          </a:ln>
+        </p:spPr>
+        <p:style>
+          <a:lnRef idx="1">
+            <a:schemeClr val="accent1"/>
+          </a:lnRef>
+          <a:fillRef idx="0">
+            <a:schemeClr val="accent1"/>
+          </a:fillRef>
+          <a:effectRef idx="0">
+            <a:schemeClr val="accent1"/>
+          </a:effectRef>
+          <a:fontRef idx="minor">
+            <a:schemeClr val="tx1"/>
+          </a:fontRef>
+        </p:style>
+      </p:cxnSp>
+      <p:sp>
+        <p:nvSpPr>
+          <p:cNvPr id="6" name="Rectangle 5">
+            <a:extLst>
+              <a:ext uri="{FF2B5EF4-FFF2-40B4-BE49-F238E27FC236}">
+                <a16:creationId xmlns:a16="http://schemas.microsoft.com/office/drawing/2014/main" id="{20817287-B485-4FD3-98D5-D0B3BC2C9C51}"/>
+              </a:ext>
+            </a:extLst>
+          </p:cNvPr>
+          <p:cNvSpPr/>
+          <p:nvPr/>
+        </p:nvSpPr>
+        <p:spPr>
+          <a:xfrm>
+            <a:off x="439961" y="2344181"/>
+            <a:ext cx="2301720" cy="369332"/>
+          </a:xfrm>
+          <a:prstGeom prst="rect">
+            <a:avLst/>
+          </a:prstGeom>
+        </p:spPr>
+        <p:txBody>
+          <a:bodyPr wrap="none">
+            <a:spAutoFit/>
+          </a:bodyPr>
+          <a:lstStyle/>
+          <a:p>
+            <a:pPr algn="ctr"/>
+            <a:r>
+              <a:rPr lang="en-US" dirty="0" err="1"/>
+              <a:t>SR</a:t>
+            </a:r>
+            <a:r>
+              <a:rPr lang="en-US" dirty="0" err="1">
+                <a:solidFill>
+                  <a:schemeClr val="tx1"/>
+                </a:solidFill>
+              </a:rPr>
+              <a:t>_min</a:t>
+            </a:r>
+            <a:r>
+              <a:rPr lang="en-US" dirty="0">
+                <a:solidFill>
+                  <a:schemeClr val="tx1"/>
+                </a:solidFill>
+              </a:rPr>
+              <a:t> &lt; SR &lt; </a:t>
+            </a:r>
+            <a:r>
+              <a:rPr lang="en-US" dirty="0" err="1"/>
+              <a:t>SR</a:t>
+            </a:r>
+            <a:r>
+              <a:rPr lang="en-US" dirty="0" err="1">
+                <a:solidFill>
+                  <a:schemeClr val="tx1"/>
+                </a:solidFill>
+              </a:rPr>
+              <a:t>_max</a:t>
+            </a:r>
+            <a:endParaRPr lang="en-US" dirty="0">
+              <a:solidFill>
+                <a:schemeClr val="tx1"/>
+              </a:solidFill>
+            </a:endParaRPr>
+          </a:p>
+        </p:txBody>
+      </p:sp>
+      <p:cxnSp>
+        <p:nvCxnSpPr>
+          <p:cNvPr id="7" name="Straight Arrow Connector 6">
+            <a:extLst>
+              <a:ext uri="{FF2B5EF4-FFF2-40B4-BE49-F238E27FC236}">
+                <a16:creationId xmlns:a16="http://schemas.microsoft.com/office/drawing/2014/main" id="{918C94F8-6916-4EBA-9851-AB05885DB7DA}"/>
+              </a:ext>
+            </a:extLst>
+          </p:cNvPr>
+          <p:cNvCxnSpPr>
+            <a:cxnSpLocks/>
+            <a:stCxn id="4" idx="2"/>
+          </p:cNvCxnSpPr>
+          <p:nvPr/>
+        </p:nvCxnSpPr>
+        <p:spPr>
+          <a:xfrm>
+            <a:off x="1590820" y="3162880"/>
+            <a:ext cx="0" cy="393120"/>
+          </a:xfrm>
+          <a:prstGeom prst="straightConnector1">
+            <a:avLst/>
+          </a:prstGeom>
+          <a:ln w="12700">
+            <a:solidFill>
+              <a:schemeClr val="tx1"/>
+            </a:solidFill>
+            <a:tailEnd type="triangle"/>
+          </a:ln>
+        </p:spPr>
+        <p:style>
+          <a:lnRef idx="1">
+            <a:schemeClr val="accent1"/>
+          </a:lnRef>
+          <a:fillRef idx="0">
+            <a:schemeClr val="accent1"/>
+          </a:fillRef>
+          <a:effectRef idx="0">
+            <a:schemeClr val="accent1"/>
+          </a:effectRef>
+          <a:fontRef idx="minor">
+            <a:schemeClr val="tx1"/>
+          </a:fontRef>
+        </p:style>
+      </p:cxnSp>
+      <p:sp>
+        <p:nvSpPr>
+          <p:cNvPr id="8" name="Rectangle 7">
+            <a:extLst>
+              <a:ext uri="{FF2B5EF4-FFF2-40B4-BE49-F238E27FC236}">
+                <a16:creationId xmlns:a16="http://schemas.microsoft.com/office/drawing/2014/main" id="{57AC35A8-E4FA-4B1A-BAA0-1A9B7DB82518}"/>
+              </a:ext>
+            </a:extLst>
+          </p:cNvPr>
+          <p:cNvSpPr/>
+          <p:nvPr/>
+        </p:nvSpPr>
+        <p:spPr>
+          <a:xfrm>
+            <a:off x="1645350" y="3096508"/>
+            <a:ext cx="579006" cy="369332"/>
+          </a:xfrm>
+          <a:prstGeom prst="rect">
+            <a:avLst/>
+          </a:prstGeom>
+          <a:ln>
+            <a:noFill/>
+          </a:ln>
+        </p:spPr>
+        <p:txBody>
+          <a:bodyPr wrap="none">
+            <a:spAutoFit/>
+          </a:bodyPr>
+          <a:lstStyle/>
+          <a:p>
+            <a:pPr algn="ctr"/>
+            <a:r>
+              <a:rPr lang="en-US" dirty="0">
+                <a:solidFill>
+                  <a:srgbClr val="00B050"/>
+                </a:solidFill>
+              </a:rPr>
+              <a:t>true</a:t>
+            </a:r>
+          </a:p>
+        </p:txBody>
+      </p:sp>
+      <p:cxnSp>
+        <p:nvCxnSpPr>
+          <p:cNvPr id="9" name="Straight Arrow Connector 8">
+            <a:extLst>
+              <a:ext uri="{FF2B5EF4-FFF2-40B4-BE49-F238E27FC236}">
+                <a16:creationId xmlns:a16="http://schemas.microsoft.com/office/drawing/2014/main" id="{DBF40544-E923-4D7F-AAAC-F94547AD2F89}"/>
+              </a:ext>
+            </a:extLst>
+          </p:cNvPr>
+          <p:cNvCxnSpPr>
+            <a:cxnSpLocks/>
+            <a:stCxn id="4" idx="3"/>
+          </p:cNvCxnSpPr>
+          <p:nvPr/>
+        </p:nvCxnSpPr>
+        <p:spPr>
+          <a:xfrm>
+            <a:off x="3086390" y="2546555"/>
+            <a:ext cx="787650" cy="0"/>
+          </a:xfrm>
+          <a:prstGeom prst="straightConnector1">
+            <a:avLst/>
+          </a:prstGeom>
+          <a:ln w="12700" cap="rnd">
+            <a:solidFill>
+              <a:schemeClr val="tx1"/>
+            </a:solidFill>
+            <a:tailEnd type="none"/>
+          </a:ln>
+        </p:spPr>
+        <p:style>
+          <a:lnRef idx="1">
+            <a:schemeClr val="accent1"/>
+          </a:lnRef>
+          <a:fillRef idx="0">
+            <a:schemeClr val="accent1"/>
+          </a:fillRef>
+          <a:effectRef idx="0">
+            <a:schemeClr val="accent1"/>
+          </a:effectRef>
+          <a:fontRef idx="minor">
+            <a:schemeClr val="tx1"/>
+          </a:fontRef>
+        </p:style>
+      </p:cxnSp>
+      <p:sp>
+        <p:nvSpPr>
+          <p:cNvPr id="10" name="Rectangle 9">
+            <a:extLst>
+              <a:ext uri="{FF2B5EF4-FFF2-40B4-BE49-F238E27FC236}">
+                <a16:creationId xmlns:a16="http://schemas.microsoft.com/office/drawing/2014/main" id="{979682A4-9011-4E1D-96A3-797DE4135E80}"/>
+              </a:ext>
+            </a:extLst>
+          </p:cNvPr>
+          <p:cNvSpPr/>
+          <p:nvPr/>
+        </p:nvSpPr>
+        <p:spPr>
+          <a:xfrm>
+            <a:off x="3182204" y="2522228"/>
+            <a:ext cx="619401" cy="369332"/>
+          </a:xfrm>
+          <a:prstGeom prst="rect">
+            <a:avLst/>
+          </a:prstGeom>
+          <a:ln>
+            <a:noFill/>
+          </a:ln>
+        </p:spPr>
+        <p:txBody>
+          <a:bodyPr wrap="none">
+            <a:spAutoFit/>
+          </a:bodyPr>
+          <a:lstStyle/>
+          <a:p>
+            <a:pPr algn="ctr"/>
+            <a:r>
+              <a:rPr lang="en-US" dirty="0">
+                <a:solidFill>
+                  <a:srgbClr val="FF0000"/>
+                </a:solidFill>
+              </a:rPr>
+              <a:t>false</a:t>
+            </a:r>
+          </a:p>
+        </p:txBody>
+      </p:sp>
+      <p:cxnSp>
+        <p:nvCxnSpPr>
+          <p:cNvPr id="11" name="Straight Arrow Connector 10">
+            <a:extLst>
+              <a:ext uri="{FF2B5EF4-FFF2-40B4-BE49-F238E27FC236}">
+                <a16:creationId xmlns:a16="http://schemas.microsoft.com/office/drawing/2014/main" id="{6219E4D0-18F9-4176-9A3B-BE9F89973702}"/>
+              </a:ext>
+            </a:extLst>
+          </p:cNvPr>
+          <p:cNvCxnSpPr>
+            <a:cxnSpLocks/>
+          </p:cNvCxnSpPr>
+          <p:nvPr/>
+        </p:nvCxnSpPr>
+        <p:spPr>
+          <a:xfrm>
+            <a:off x="3874040" y="1255354"/>
+            <a:ext cx="0" cy="1291201"/>
+          </a:xfrm>
+          <a:prstGeom prst="straightConnector1">
+            <a:avLst/>
+          </a:prstGeom>
+          <a:ln w="12700" cap="rnd">
+            <a:solidFill>
+              <a:schemeClr val="tx1"/>
+            </a:solidFill>
+            <a:tailEnd type="none"/>
+          </a:ln>
+        </p:spPr>
+        <p:style>
+          <a:lnRef idx="1">
+            <a:schemeClr val="accent1"/>
+          </a:lnRef>
+          <a:fillRef idx="0">
+            <a:schemeClr val="accent1"/>
+          </a:fillRef>
+          <a:effectRef idx="0">
+            <a:schemeClr val="accent1"/>
+          </a:effectRef>
+          <a:fontRef idx="minor">
+            <a:schemeClr val="tx1"/>
+          </a:fontRef>
+        </p:style>
+      </p:cxnSp>
+      <p:cxnSp>
+        <p:nvCxnSpPr>
+          <p:cNvPr id="12" name="Straight Arrow Connector 11">
+            <a:extLst>
+              <a:ext uri="{FF2B5EF4-FFF2-40B4-BE49-F238E27FC236}">
+                <a16:creationId xmlns:a16="http://schemas.microsoft.com/office/drawing/2014/main" id="{EA34D3C3-F728-4510-87FB-2A6184A29763}"/>
+              </a:ext>
+            </a:extLst>
+          </p:cNvPr>
+          <p:cNvCxnSpPr>
+            <a:cxnSpLocks/>
+            <a:stCxn id="3" idx="2"/>
+          </p:cNvCxnSpPr>
+          <p:nvPr/>
+        </p:nvCxnSpPr>
+        <p:spPr>
+          <a:xfrm>
+            <a:off x="2897051" y="1255354"/>
+            <a:ext cx="976988" cy="0"/>
+          </a:xfrm>
+          <a:prstGeom prst="straightConnector1">
+            <a:avLst/>
+          </a:prstGeom>
+          <a:ln w="12700" cap="rnd">
+            <a:solidFill>
+              <a:schemeClr val="tx1"/>
+            </a:solidFill>
+            <a:headEnd type="triangle"/>
+            <a:tailEnd type="none"/>
+          </a:ln>
+        </p:spPr>
+        <p:style>
+          <a:lnRef idx="1">
+            <a:schemeClr val="accent1"/>
+          </a:lnRef>
+          <a:fillRef idx="0">
+            <a:schemeClr val="accent1"/>
+          </a:fillRef>
+          <a:effectRef idx="0">
+            <a:schemeClr val="accent1"/>
+          </a:effectRef>
+          <a:fontRef idx="minor">
+            <a:schemeClr val="tx1"/>
+          </a:fontRef>
+        </p:style>
+      </p:cxnSp>
+      <p:cxnSp>
+        <p:nvCxnSpPr>
+          <p:cNvPr id="15" name="Straight Arrow Connector 14">
+            <a:extLst>
+              <a:ext uri="{FF2B5EF4-FFF2-40B4-BE49-F238E27FC236}">
+                <a16:creationId xmlns:a16="http://schemas.microsoft.com/office/drawing/2014/main" id="{72E07A82-FCBB-4138-8839-7650115553F5}"/>
+              </a:ext>
+            </a:extLst>
+          </p:cNvPr>
+          <p:cNvCxnSpPr>
+            <a:cxnSpLocks/>
+            <a:stCxn id="2" idx="1"/>
+            <a:endCxn id="3" idx="0"/>
+          </p:cNvCxnSpPr>
+          <p:nvPr/>
+        </p:nvCxnSpPr>
+        <p:spPr>
+          <a:xfrm>
+            <a:off x="1590820" y="578263"/>
+            <a:ext cx="0" cy="268099"/>
+          </a:xfrm>
+          <a:prstGeom prst="straightConnector1">
+            <a:avLst/>
+          </a:prstGeom>
+          <a:ln w="12700">
+            <a:solidFill>
+              <a:schemeClr val="tx1"/>
+            </a:solidFill>
+            <a:tailEnd type="triangle"/>
+          </a:ln>
+        </p:spPr>
+        <p:style>
+          <a:lnRef idx="1">
+            <a:schemeClr val="accent1"/>
+          </a:lnRef>
+          <a:fillRef idx="0">
+            <a:schemeClr val="accent1"/>
+          </a:fillRef>
+          <a:effectRef idx="0">
+            <a:schemeClr val="accent1"/>
+          </a:effectRef>
+          <a:fontRef idx="minor">
+            <a:schemeClr val="tx1"/>
+          </a:fontRef>
+        </p:style>
+      </p:cxnSp>
     </p:spTree>
     <p:extLst>
       <p:ext uri="{BB962C8B-B14F-4D97-AF65-F5344CB8AC3E}">

</xml_diff>